<commit_message>
adding information about Colab
</commit_message>
<xml_diff>
--- a/R_in_GoogleColab.pptx
+++ b/R_in_GoogleColab.pptx
@@ -261,7 +261,7 @@
           <a:p>
             <a:fld id="{242D8212-E611-9F44-BAFD-B90C766222EF}" type="datetimeFigureOut">
               <a:rPr kumimoji="1" lang="ja-JP" altLang="en-US" smtClean="0"/>
-              <a:t>2024/9/19</a:t>
+              <a:t>2024/9/21</a:t>
             </a:fld>
             <a:endParaRPr kumimoji="1" lang="ja-JP" altLang="en-US"/>
           </a:p>
@@ -491,7 +491,7 @@
           <a:p>
             <a:fld id="{242D8212-E611-9F44-BAFD-B90C766222EF}" type="datetimeFigureOut">
               <a:rPr kumimoji="1" lang="ja-JP" altLang="en-US" smtClean="0"/>
-              <a:t>2024/9/19</a:t>
+              <a:t>2024/9/21</a:t>
             </a:fld>
             <a:endParaRPr kumimoji="1" lang="ja-JP" altLang="en-US"/>
           </a:p>
@@ -731,7 +731,7 @@
           <a:p>
             <a:fld id="{242D8212-E611-9F44-BAFD-B90C766222EF}" type="datetimeFigureOut">
               <a:rPr kumimoji="1" lang="ja-JP" altLang="en-US" smtClean="0"/>
-              <a:t>2024/9/19</a:t>
+              <a:t>2024/9/21</a:t>
             </a:fld>
             <a:endParaRPr kumimoji="1" lang="ja-JP" altLang="en-US"/>
           </a:p>
@@ -872,7 +872,7 @@
           <a:p>
             <a:fld id="{5BBE060C-CE75-43D6-AE24-E13A1567519C}" type="datetimeFigureOut">
               <a:rPr kumimoji="1" lang="ja-JP" altLang="en-US" smtClean="0"/>
-              <a:t>2024/9/19</a:t>
+              <a:t>2024/9/21</a:t>
             </a:fld>
             <a:endParaRPr kumimoji="1" lang="ja-JP" altLang="en-US"/>
           </a:p>
@@ -1266,7 +1266,7 @@
           <a:p>
             <a:fld id="{242D8212-E611-9F44-BAFD-B90C766222EF}" type="datetimeFigureOut">
               <a:rPr kumimoji="1" lang="ja-JP" altLang="en-US" smtClean="0"/>
-              <a:t>2024/9/19</a:t>
+              <a:t>2024/9/21</a:t>
             </a:fld>
             <a:endParaRPr kumimoji="1" lang="ja-JP" altLang="en-US"/>
           </a:p>
@@ -1541,7 +1541,7 @@
           <a:p>
             <a:fld id="{242D8212-E611-9F44-BAFD-B90C766222EF}" type="datetimeFigureOut">
               <a:rPr kumimoji="1" lang="ja-JP" altLang="en-US" smtClean="0"/>
-              <a:t>2024/9/19</a:t>
+              <a:t>2024/9/21</a:t>
             </a:fld>
             <a:endParaRPr kumimoji="1" lang="ja-JP" altLang="en-US"/>
           </a:p>
@@ -1870,7 +1870,7 @@
           <a:p>
             <a:fld id="{242D8212-E611-9F44-BAFD-B90C766222EF}" type="datetimeFigureOut">
               <a:rPr kumimoji="1" lang="ja-JP" altLang="en-US" smtClean="0"/>
-              <a:t>2024/9/19</a:t>
+              <a:t>2024/9/21</a:t>
             </a:fld>
             <a:endParaRPr kumimoji="1" lang="ja-JP" altLang="en-US"/>
           </a:p>
@@ -2346,7 +2346,7 @@
           <a:p>
             <a:fld id="{242D8212-E611-9F44-BAFD-B90C766222EF}" type="datetimeFigureOut">
               <a:rPr kumimoji="1" lang="ja-JP" altLang="en-US" smtClean="0"/>
-              <a:t>2024/9/19</a:t>
+              <a:t>2024/9/21</a:t>
             </a:fld>
             <a:endParaRPr kumimoji="1" lang="ja-JP" altLang="en-US"/>
           </a:p>
@@ -2487,7 +2487,7 @@
           <a:p>
             <a:fld id="{242D8212-E611-9F44-BAFD-B90C766222EF}" type="datetimeFigureOut">
               <a:rPr kumimoji="1" lang="ja-JP" altLang="en-US" smtClean="0"/>
-              <a:t>2024/9/19</a:t>
+              <a:t>2024/9/21</a:t>
             </a:fld>
             <a:endParaRPr kumimoji="1" lang="ja-JP" altLang="en-US"/>
           </a:p>
@@ -2600,7 +2600,7 @@
           <a:p>
             <a:fld id="{242D8212-E611-9F44-BAFD-B90C766222EF}" type="datetimeFigureOut">
               <a:rPr kumimoji="1" lang="ja-JP" altLang="en-US" smtClean="0"/>
-              <a:t>2024/9/19</a:t>
+              <a:t>2024/9/21</a:t>
             </a:fld>
             <a:endParaRPr kumimoji="1" lang="ja-JP" altLang="en-US"/>
           </a:p>
@@ -2943,7 +2943,7 @@
           <a:p>
             <a:fld id="{242D8212-E611-9F44-BAFD-B90C766222EF}" type="datetimeFigureOut">
               <a:rPr kumimoji="1" lang="ja-JP" altLang="en-US" smtClean="0"/>
-              <a:t>2024/9/19</a:t>
+              <a:t>2024/9/21</a:t>
             </a:fld>
             <a:endParaRPr kumimoji="1" lang="ja-JP" altLang="en-US"/>
           </a:p>
@@ -3231,7 +3231,7 @@
           <a:p>
             <a:fld id="{242D8212-E611-9F44-BAFD-B90C766222EF}" type="datetimeFigureOut">
               <a:rPr kumimoji="1" lang="ja-JP" altLang="en-US" smtClean="0"/>
-              <a:t>2024/9/19</a:t>
+              <a:t>2024/9/21</a:t>
             </a:fld>
             <a:endParaRPr kumimoji="1" lang="ja-JP" altLang="en-US"/>
           </a:p>
@@ -3504,7 +3504,7 @@
           <a:p>
             <a:fld id="{242D8212-E611-9F44-BAFD-B90C766222EF}" type="datetimeFigureOut">
               <a:rPr kumimoji="1" lang="ja-JP" altLang="en-US" smtClean="0"/>
-              <a:t>2024/9/19</a:t>
+              <a:t>2024/9/21</a:t>
             </a:fld>
             <a:endParaRPr kumimoji="1" lang="ja-JP" altLang="en-US"/>
           </a:p>
@@ -3991,8 +3991,8 @@
         </p:nvSpPr>
         <p:spPr>
           <a:xfrm>
-            <a:off x="504823" y="4283821"/>
-            <a:ext cx="11360605" cy="1299971"/>
+            <a:off x="417737" y="4098764"/>
+            <a:ext cx="11534777" cy="2130968"/>
           </a:xfrm>
           <a:prstGeom prst="rect">
             <a:avLst/>
@@ -4060,15 +4060,23 @@
               </a:lnSpc>
             </a:pPr>
             <a:r>
-              <a:rPr lang="ja-JP" altLang="en-US"/>
-              <a:t>・　</a:t>
-            </a:r>
-            <a:r>
               <a:rPr lang="ja-JP" altLang="en-US">
                 <a:solidFill>
                   <a:srgbClr val="FF0000"/>
                 </a:solidFill>
               </a:rPr>
+              <a:t>・</a:t>
+            </a:r>
+            <a:r>
+              <a:rPr lang="ja-JP" altLang="en-US"/>
+              <a:t>　</a:t>
+            </a:r>
+            <a:r>
+              <a:rPr lang="ja-JP" altLang="en-US">
+                <a:solidFill>
+                  <a:srgbClr val="FF0000"/>
+                </a:solidFill>
+              </a:rPr>
               <a:t>上記</a:t>
             </a:r>
             <a:r>
@@ -4085,7 +4093,7 @@
                   <a:srgbClr val="FF0000"/>
                 </a:solidFill>
               </a:rPr>
-              <a:t>の正式から入るより，</a:t>
+              <a:t>の公式から入るより，</a:t>
             </a:r>
             <a:r>
               <a:rPr kumimoji="1" lang="en-US" altLang="ja-JP" sz="1800" dirty="0">
@@ -4123,6 +4131,109 @@
               <a:solidFill>
                 <a:srgbClr val="FF0000"/>
               </a:solidFill>
+            </a:endParaRPr>
+          </a:p>
+          <a:p>
+            <a:pPr>
+              <a:lnSpc>
+                <a:spcPct val="150000"/>
+              </a:lnSpc>
+            </a:pPr>
+            <a:r>
+              <a:rPr kumimoji="1" lang="ja-JP" altLang="en-US" sz="1800">
+                <a:solidFill>
+                  <a:srgbClr val="FF0000"/>
+                </a:solidFill>
+              </a:rPr>
+              <a:t>・　ただし，</a:t>
+            </a:r>
+            <a:r>
+              <a:rPr kumimoji="1" lang="en" altLang="ja-JP" sz="1800" dirty="0">
+                <a:solidFill>
+                  <a:srgbClr val="FF0000"/>
+                </a:solidFill>
+              </a:rPr>
+              <a:t> </a:t>
+            </a:r>
+            <a:r>
+              <a:rPr kumimoji="1" lang="en" altLang="ja-JP" sz="1800" dirty="0" err="1">
+                <a:solidFill>
+                  <a:srgbClr val="FF0000"/>
+                </a:solidFill>
+              </a:rPr>
+              <a:t>ipynb</a:t>
+            </a:r>
+            <a:r>
+              <a:rPr kumimoji="1" lang="ja-JP" altLang="en-US" sz="1800">
+                <a:solidFill>
+                  <a:srgbClr val="FF0000"/>
+                </a:solidFill>
+              </a:rPr>
+              <a:t>ファイルを開く前に公式サイトで</a:t>
+            </a:r>
+            <a:r>
+              <a:rPr lang="ja-JP" altLang="en-US" sz="1800">
+                <a:solidFill>
+                  <a:srgbClr val="FF0000"/>
+                </a:solidFill>
+                <a:latin typeface="+mn-ea"/>
+              </a:rPr>
+              <a:t>「接続」のランタイムのタイプを「</a:t>
+            </a:r>
+            <a:r>
+              <a:rPr lang="en-US" altLang="ja-JP" sz="1800" dirty="0">
+                <a:solidFill>
+                  <a:srgbClr val="FF0000"/>
+                </a:solidFill>
+                <a:latin typeface="+mn-ea"/>
+              </a:rPr>
+              <a:t>R</a:t>
+            </a:r>
+            <a:r>
+              <a:rPr lang="ja-JP" altLang="en-US" sz="1800">
+                <a:solidFill>
+                  <a:srgbClr val="FF0000"/>
+                </a:solidFill>
+                <a:latin typeface="+mn-ea"/>
+              </a:rPr>
+              <a:t>」にしておくこと！　　</a:t>
+            </a:r>
+            <a:endParaRPr lang="en-US" altLang="ja-JP" sz="1800" dirty="0">
+              <a:solidFill>
+                <a:srgbClr val="FF0000"/>
+              </a:solidFill>
+              <a:latin typeface="+mn-ea"/>
+            </a:endParaRPr>
+          </a:p>
+          <a:p>
+            <a:pPr>
+              <a:lnSpc>
+                <a:spcPct val="150000"/>
+              </a:lnSpc>
+            </a:pPr>
+            <a:r>
+              <a:rPr lang="ja-JP" altLang="en-US">
+                <a:solidFill>
+                  <a:srgbClr val="FF0000"/>
+                </a:solidFill>
+                <a:latin typeface="+mn-ea"/>
+              </a:rPr>
+              <a:t>　　</a:t>
+            </a:r>
+            <a:r>
+              <a:rPr lang="ja-JP" altLang="en-US" sz="1800">
+                <a:solidFill>
+                  <a:srgbClr val="FF0000"/>
+                </a:solidFill>
+                <a:latin typeface="+mn-ea"/>
+              </a:rPr>
+              <a:t>次スライド参照．</a:t>
+            </a:r>
+            <a:endParaRPr lang="en-US" altLang="ja-JP" sz="1800" dirty="0">
+              <a:solidFill>
+                <a:srgbClr val="FF0000"/>
+              </a:solidFill>
+              <a:latin typeface="+mn-ea"/>
             </a:endParaRPr>
           </a:p>
         </p:txBody>
@@ -4568,38 +4679,42 @@
               </a:lnSpc>
             </a:pPr>
             <a:r>
+              <a:rPr lang="en-US" altLang="ja-JP" sz="1600" dirty="0" err="1">
+                <a:solidFill>
+                  <a:srgbClr val="FF0000"/>
+                </a:solidFill>
+                <a:latin typeface="+mn-ea"/>
+              </a:rPr>
+              <a:t>Colab</a:t>
+            </a:r>
+            <a:r>
               <a:rPr lang="ja-JP" altLang="en-US" sz="1600">
+                <a:solidFill>
+                  <a:srgbClr val="FF0000"/>
+                </a:solidFill>
                 <a:latin typeface="+mn-ea"/>
               </a:rPr>
-              <a:t>マイドライブ</a:t>
+              <a:t>の公式サイトにおいて，「接続」のランタイムのタイプを「</a:t>
             </a:r>
             <a:r>
               <a:rPr lang="en-US" altLang="ja-JP" sz="1600" dirty="0">
+                <a:solidFill>
+                  <a:srgbClr val="FF0000"/>
+                </a:solidFill>
                 <a:latin typeface="+mn-ea"/>
               </a:rPr>
-              <a:t> </a:t>
+              <a:t>R</a:t>
             </a:r>
             <a:r>
               <a:rPr lang="ja-JP" altLang="en-US" sz="1600">
+                <a:solidFill>
+                  <a:srgbClr val="FF0000"/>
+                </a:solidFill>
                 <a:latin typeface="+mn-ea"/>
               </a:rPr>
-              <a:t>内の</a:t>
-            </a:r>
-            <a:r>
-              <a:rPr lang="en" altLang="ja-JP" sz="1600" dirty="0">
-                <a:latin typeface="+mn-ea"/>
-              </a:rPr>
-              <a:t>R_hokudai2024.ipynb</a:t>
-            </a:r>
-            <a:r>
-              <a:rPr lang="ja-JP" altLang="en-US" sz="1600">
-                <a:latin typeface="+mn-ea"/>
-              </a:rPr>
-              <a:t>を開く．</a:t>
-            </a:r>
-            <a:endParaRPr lang="en-US" altLang="ja-JP" sz="1600" dirty="0">
-              <a:latin typeface="+mn-ea"/>
-            </a:endParaRPr>
+              <a:t>」に変更する．</a:t>
+            </a:r>
+            <a:endParaRPr kumimoji="1" lang="en-US" altLang="ja-JP" sz="1600" dirty="0"/>
           </a:p>
           <a:p>
             <a:pPr>
@@ -4611,43 +4726,31 @@
               <a:rPr lang="ja-JP" altLang="en-US" sz="1600">
                 <a:latin typeface="+mn-ea"/>
               </a:rPr>
-              <a:t>「接続」でランタイムのタイプが「</a:t>
+              <a:t>マイドライブ</a:t>
             </a:r>
             <a:r>
               <a:rPr lang="en-US" altLang="ja-JP" sz="1600" dirty="0">
                 <a:latin typeface="+mn-ea"/>
               </a:rPr>
-              <a:t>R</a:t>
+              <a:t> </a:t>
             </a:r>
             <a:r>
               <a:rPr lang="ja-JP" altLang="en-US" sz="1600">
                 <a:latin typeface="+mn-ea"/>
               </a:rPr>
-              <a:t>」であることを確認．</a:t>
-            </a:r>
-            <a:r>
-              <a:rPr lang="en-US" altLang="ja-JP" sz="1600" dirty="0">
+              <a:t>内の</a:t>
+            </a:r>
+            <a:r>
+              <a:rPr lang="en" altLang="ja-JP" sz="1600" dirty="0">
                 <a:latin typeface="+mn-ea"/>
               </a:rPr>
-              <a:t>Python 3 </a:t>
+              <a:t>R_hokudai2024.ipynb</a:t>
             </a:r>
             <a:r>
               <a:rPr lang="ja-JP" altLang="en-US" sz="1600">
                 <a:latin typeface="+mn-ea"/>
               </a:rPr>
-              <a:t>ならば</a:t>
-            </a:r>
-            <a:r>
-              <a:rPr lang="en-US" altLang="ja-JP" sz="1600" dirty="0">
-                <a:latin typeface="+mn-ea"/>
-              </a:rPr>
-              <a:t>R</a:t>
-            </a:r>
-            <a:r>
-              <a:rPr lang="ja-JP" altLang="en-US" sz="1600">
-                <a:latin typeface="+mn-ea"/>
-              </a:rPr>
-              <a:t>に変更</a:t>
+              <a:t>を開く．</a:t>
             </a:r>
             <a:endParaRPr lang="en-US" altLang="ja-JP" sz="1600" dirty="0">
               <a:latin typeface="+mn-ea"/>
@@ -4993,11 +5096,11 @@
   <p:clrMapOvr>
     <a:masterClrMapping/>
   </p:clrMapOvr>
-  <mc:AlternateContent xmlns:mc="http://schemas.openxmlformats.org/markup-compatibility/2006">
-    <mc:Choice xmlns:p14="http://schemas.microsoft.com/office/powerpoint/2010/main" Requires="p14">
+  <mc:AlternateContent xmlns:mc="http://schemas.openxmlformats.org/markup-compatibility/2006" xmlns:p14="http://schemas.microsoft.com/office/powerpoint/2010/main">
+    <mc:Choice Requires="p14">
       <p:transition spd="slow" p14:dur="2250" advClick="0"/>
     </mc:Choice>
-    <mc:Fallback>
+    <mc:Fallback xmlns="">
       <p:transition spd="slow" advClick="0"/>
     </mc:Fallback>
   </mc:AlternateContent>

</xml_diff>